<commit_message>
push final para correção
</commit_message>
<xml_diff>
--- a/Apresentação/Apresentação 65DSD.pptx
+++ b/Apresentação/Apresentação 65DSD.pptx
@@ -218,7 +218,7 @@
           <a:p>
             <a:fld id="{12028CC1-B90E-47D8-99C5-6BAA1811C342}" type="datetimeFigureOut">
               <a:rPr lang="pt-BR" smtClean="0"/>
-              <a:t>14/10/2025</a:t>
+              <a:t>16/10/2025</a:t>
             </a:fld>
             <a:endParaRPr lang="pt-BR" dirty="0"/>
           </a:p>
@@ -664,7 +664,7 @@
           <a:p>
             <a:fld id="{F3B4B977-AD5C-4F3D-992F-860711DBDA8C}" type="datetimeFigureOut">
               <a:rPr lang="pt-BR" smtClean="0"/>
-              <a:t>14/10/2025</a:t>
+              <a:t>16/10/2025</a:t>
             </a:fld>
             <a:endParaRPr lang="pt-BR" dirty="0"/>
           </a:p>
@@ -832,7 +832,7 @@
           <a:p>
             <a:fld id="{F3B4B977-AD5C-4F3D-992F-860711DBDA8C}" type="datetimeFigureOut">
               <a:rPr lang="pt-BR" smtClean="0"/>
-              <a:t>14/10/2025</a:t>
+              <a:t>16/10/2025</a:t>
             </a:fld>
             <a:endParaRPr lang="pt-BR" dirty="0"/>
           </a:p>
@@ -1010,7 +1010,7 @@
           <a:p>
             <a:fld id="{F3B4B977-AD5C-4F3D-992F-860711DBDA8C}" type="datetimeFigureOut">
               <a:rPr lang="pt-BR" smtClean="0"/>
-              <a:t>14/10/2025</a:t>
+              <a:t>16/10/2025</a:t>
             </a:fld>
             <a:endParaRPr lang="pt-BR" dirty="0"/>
           </a:p>
@@ -1178,7 +1178,7 @@
           <a:p>
             <a:fld id="{F3B4B977-AD5C-4F3D-992F-860711DBDA8C}" type="datetimeFigureOut">
               <a:rPr lang="pt-BR" smtClean="0"/>
-              <a:t>14/10/2025</a:t>
+              <a:t>16/10/2025</a:t>
             </a:fld>
             <a:endParaRPr lang="pt-BR" dirty="0"/>
           </a:p>
@@ -1423,7 +1423,7 @@
           <a:p>
             <a:fld id="{F3B4B977-AD5C-4F3D-992F-860711DBDA8C}" type="datetimeFigureOut">
               <a:rPr lang="pt-BR" smtClean="0"/>
-              <a:t>14/10/2025</a:t>
+              <a:t>16/10/2025</a:t>
             </a:fld>
             <a:endParaRPr lang="pt-BR" dirty="0"/>
           </a:p>
@@ -1708,7 +1708,7 @@
           <a:p>
             <a:fld id="{F3B4B977-AD5C-4F3D-992F-860711DBDA8C}" type="datetimeFigureOut">
               <a:rPr lang="pt-BR" smtClean="0"/>
-              <a:t>14/10/2025</a:t>
+              <a:t>16/10/2025</a:t>
             </a:fld>
             <a:endParaRPr lang="pt-BR" dirty="0"/>
           </a:p>
@@ -2127,7 +2127,7 @@
           <a:p>
             <a:fld id="{F3B4B977-AD5C-4F3D-992F-860711DBDA8C}" type="datetimeFigureOut">
               <a:rPr lang="pt-BR" smtClean="0"/>
-              <a:t>14/10/2025</a:t>
+              <a:t>16/10/2025</a:t>
             </a:fld>
             <a:endParaRPr lang="pt-BR" dirty="0"/>
           </a:p>
@@ -2244,7 +2244,7 @@
           <a:p>
             <a:fld id="{F3B4B977-AD5C-4F3D-992F-860711DBDA8C}" type="datetimeFigureOut">
               <a:rPr lang="pt-BR" smtClean="0"/>
-              <a:t>14/10/2025</a:t>
+              <a:t>16/10/2025</a:t>
             </a:fld>
             <a:endParaRPr lang="pt-BR" dirty="0"/>
           </a:p>
@@ -2339,7 +2339,7 @@
           <a:p>
             <a:fld id="{F3B4B977-AD5C-4F3D-992F-860711DBDA8C}" type="datetimeFigureOut">
               <a:rPr lang="pt-BR" smtClean="0"/>
-              <a:t>14/10/2025</a:t>
+              <a:t>16/10/2025</a:t>
             </a:fld>
             <a:endParaRPr lang="pt-BR" dirty="0"/>
           </a:p>
@@ -2614,7 +2614,7 @@
           <a:p>
             <a:fld id="{F3B4B977-AD5C-4F3D-992F-860711DBDA8C}" type="datetimeFigureOut">
               <a:rPr lang="pt-BR" smtClean="0"/>
-              <a:t>14/10/2025</a:t>
+              <a:t>16/10/2025</a:t>
             </a:fld>
             <a:endParaRPr lang="pt-BR" dirty="0"/>
           </a:p>
@@ -2866,7 +2866,7 @@
           <a:p>
             <a:fld id="{F3B4B977-AD5C-4F3D-992F-860711DBDA8C}" type="datetimeFigureOut">
               <a:rPr lang="pt-BR" smtClean="0"/>
-              <a:t>14/10/2025</a:t>
+              <a:t>16/10/2025</a:t>
             </a:fld>
             <a:endParaRPr lang="pt-BR" dirty="0"/>
           </a:p>
@@ -3082,7 +3082,7 @@
           <a:p>
             <a:fld id="{F3B4B977-AD5C-4F3D-992F-860711DBDA8C}" type="datetimeFigureOut">
               <a:rPr lang="pt-BR" smtClean="0"/>
-              <a:t>14/10/2025</a:t>
+              <a:t>16/10/2025</a:t>
             </a:fld>
             <a:endParaRPr lang="pt-BR" dirty="0"/>
           </a:p>
@@ -4542,10 +4542,10 @@
       </p:pic>
       <p:pic>
         <p:nvPicPr>
-          <p:cNvPr id="6" name="Gráfico 5">
+          <p:cNvPr id="3" name="Gráfico 2">
             <a:extLst>
               <a:ext uri="{FF2B5EF4-FFF2-40B4-BE49-F238E27FC236}">
-                <a16:creationId xmlns:a16="http://schemas.microsoft.com/office/drawing/2014/main" id="{8A9EBCDC-05AB-6E2F-33DC-E55A78327E3E}"/>
+                <a16:creationId xmlns:a16="http://schemas.microsoft.com/office/drawing/2014/main" id="{8CFE6D3D-BC1C-B1B4-9B68-2952D3D7ECC9}"/>
               </a:ext>
             </a:extLst>
           </p:cNvPr>
@@ -4568,8 +4568,8 @@
         </p:blipFill>
         <p:spPr>
           <a:xfrm>
-            <a:off x="0" y="1370421"/>
-            <a:ext cx="9144000" cy="4117158"/>
+            <a:off x="0" y="980728"/>
+            <a:ext cx="9144000" cy="5633663"/>
           </a:xfrm>
           <a:prstGeom prst="rect">
             <a:avLst/>
@@ -6829,14 +6829,6 @@
 </file>
 
 <file path=customXml/item1.xml><?xml version="1.0" encoding="utf-8"?>
-<p:properties xmlns:p="http://schemas.microsoft.com/office/2006/metadata/properties" xmlns:xsi="http://www.w3.org/2001/XMLSchema-instance" xmlns:pc="http://schemas.microsoft.com/office/infopath/2007/PartnerControls">
-  <documentManagement>
-    <_activity xmlns="613f77af-de62-4afe-982b-138aea4fef3c" xsi:nil="true"/>
-  </documentManagement>
-</p:properties>
-</file>
-
-<file path=customXml/item2.xml><?xml version="1.0" encoding="utf-8"?>
 <ct:contentTypeSchema xmlns:ct="http://schemas.microsoft.com/office/2006/metadata/contentType" xmlns:ma="http://schemas.microsoft.com/office/2006/metadata/properties/metaAttributes" ct:_="" ma:_="" ma:contentTypeName="Document" ma:contentTypeID="0x0101002EBECF9B0ABA5044AE17B1D320DD2A6F" ma:contentTypeVersion="12" ma:contentTypeDescription="Create a new document." ma:contentTypeScope="" ma:versionID="f185e081e10ec115c2640ace612104b9">
   <xsd:schema xmlns:xsd="http://www.w3.org/2001/XMLSchema" xmlns:xs="http://www.w3.org/2001/XMLSchema" xmlns:p="http://schemas.microsoft.com/office/2006/metadata/properties" xmlns:ns3="613f77af-de62-4afe-982b-138aea4fef3c" targetNamespace="http://schemas.microsoft.com/office/2006/metadata/properties" ma:root="true" ma:fieldsID="0a63cb9c68d38ddcb7679a7bdbafb55b" ns3:_="">
     <xsd:import namespace="613f77af-de62-4afe-982b-138aea4fef3c"/>
@@ -7030,6 +7022,14 @@
 </ct:contentTypeSchema>
 </file>
 
+<file path=customXml/item2.xml><?xml version="1.0" encoding="utf-8"?>
+<p:properties xmlns:p="http://schemas.microsoft.com/office/2006/metadata/properties" xmlns:xsi="http://www.w3.org/2001/XMLSchema-instance" xmlns:pc="http://schemas.microsoft.com/office/infopath/2007/PartnerControls">
+  <documentManagement>
+    <_activity xmlns="613f77af-de62-4afe-982b-138aea4fef3c" xsi:nil="true"/>
+  </documentManagement>
+</p:properties>
+</file>
+
 <file path=customXml/item3.xml><?xml version="1.0" encoding="utf-8"?>
 <?mso-contentType ?>
 <FormTemplates xmlns="http://schemas.microsoft.com/sharepoint/v3/contenttype/forms">
@@ -7040,22 +7040,6 @@
 </file>
 
 <file path=customXml/itemProps1.xml><?xml version="1.0" encoding="utf-8"?>
-<ds:datastoreItem xmlns:ds="http://schemas.openxmlformats.org/officeDocument/2006/customXml" ds:itemID="{D1D8F174-05DB-41F6-B191-F9580A6633C3}">
-  <ds:schemaRefs>
-    <ds:schemaRef ds:uri="http://purl.org/dc/dcmitype/"/>
-    <ds:schemaRef ds:uri="http://purl.org/dc/elements/1.1/"/>
-    <ds:schemaRef ds:uri="http://schemas.microsoft.com/office/2006/metadata/properties"/>
-    <ds:schemaRef ds:uri="http://purl.org/dc/terms/"/>
-    <ds:schemaRef ds:uri="http://www.w3.org/XML/1998/namespace"/>
-    <ds:schemaRef ds:uri="http://schemas.microsoft.com/office/2006/documentManagement/types"/>
-    <ds:schemaRef ds:uri="http://schemas.microsoft.com/office/infopath/2007/PartnerControls"/>
-    <ds:schemaRef ds:uri="http://schemas.openxmlformats.org/package/2006/metadata/core-properties"/>
-    <ds:schemaRef ds:uri="613f77af-de62-4afe-982b-138aea4fef3c"/>
-  </ds:schemaRefs>
-</ds:datastoreItem>
-</file>
-
-<file path=customXml/itemProps2.xml><?xml version="1.0" encoding="utf-8"?>
 <ds:datastoreItem xmlns:ds="http://schemas.openxmlformats.org/officeDocument/2006/customXml" ds:itemID="{FF5184F0-A663-45A9-BCC7-22C1C7642198}">
   <ds:schemaRefs>
     <ds:schemaRef ds:uri="http://schemas.microsoft.com/office/2006/metadata/contentType"/>
@@ -7073,6 +7057,22 @@
 </ds:datastoreItem>
 </file>
 
+<file path=customXml/itemProps2.xml><?xml version="1.0" encoding="utf-8"?>
+<ds:datastoreItem xmlns:ds="http://schemas.openxmlformats.org/officeDocument/2006/customXml" ds:itemID="{D1D8F174-05DB-41F6-B191-F9580A6633C3}">
+  <ds:schemaRefs>
+    <ds:schemaRef ds:uri="http://purl.org/dc/dcmitype/"/>
+    <ds:schemaRef ds:uri="http://purl.org/dc/elements/1.1/"/>
+    <ds:schemaRef ds:uri="http://schemas.microsoft.com/office/2006/metadata/properties"/>
+    <ds:schemaRef ds:uri="http://purl.org/dc/terms/"/>
+    <ds:schemaRef ds:uri="http://www.w3.org/XML/1998/namespace"/>
+    <ds:schemaRef ds:uri="http://schemas.microsoft.com/office/2006/documentManagement/types"/>
+    <ds:schemaRef ds:uri="http://schemas.microsoft.com/office/infopath/2007/PartnerControls"/>
+    <ds:schemaRef ds:uri="http://schemas.openxmlformats.org/package/2006/metadata/core-properties"/>
+    <ds:schemaRef ds:uri="613f77af-de62-4afe-982b-138aea4fef3c"/>
+  </ds:schemaRefs>
+</ds:datastoreItem>
+</file>
+
 <file path=customXml/itemProps3.xml><?xml version="1.0" encoding="utf-8"?>
 <ds:datastoreItem xmlns:ds="http://schemas.openxmlformats.org/officeDocument/2006/customXml" ds:itemID="{A247057C-ECE9-462C-87AA-B340D2DFD6C2}">
   <ds:schemaRefs>

</xml_diff>

<commit_message>
otimização semáforos e melhoria GUI
</commit_message>
<xml_diff>
--- a/Apresentação/Apresentação 65DSD.pptx
+++ b/Apresentação/Apresentação 65DSD.pptx
@@ -218,7 +218,7 @@
           <a:p>
             <a:fld id="{12028CC1-B90E-47D8-99C5-6BAA1811C342}" type="datetimeFigureOut">
               <a:rPr lang="pt-BR" smtClean="0"/>
-              <a:t>16/10/2025</a:t>
+              <a:t>17/10/2025</a:t>
             </a:fld>
             <a:endParaRPr lang="pt-BR" dirty="0"/>
           </a:p>
@@ -664,7 +664,7 @@
           <a:p>
             <a:fld id="{F3B4B977-AD5C-4F3D-992F-860711DBDA8C}" type="datetimeFigureOut">
               <a:rPr lang="pt-BR" smtClean="0"/>
-              <a:t>16/10/2025</a:t>
+              <a:t>17/10/2025</a:t>
             </a:fld>
             <a:endParaRPr lang="pt-BR" dirty="0"/>
           </a:p>
@@ -832,7 +832,7 @@
           <a:p>
             <a:fld id="{F3B4B977-AD5C-4F3D-992F-860711DBDA8C}" type="datetimeFigureOut">
               <a:rPr lang="pt-BR" smtClean="0"/>
-              <a:t>16/10/2025</a:t>
+              <a:t>17/10/2025</a:t>
             </a:fld>
             <a:endParaRPr lang="pt-BR" dirty="0"/>
           </a:p>
@@ -1010,7 +1010,7 @@
           <a:p>
             <a:fld id="{F3B4B977-AD5C-4F3D-992F-860711DBDA8C}" type="datetimeFigureOut">
               <a:rPr lang="pt-BR" smtClean="0"/>
-              <a:t>16/10/2025</a:t>
+              <a:t>17/10/2025</a:t>
             </a:fld>
             <a:endParaRPr lang="pt-BR" dirty="0"/>
           </a:p>
@@ -1178,7 +1178,7 @@
           <a:p>
             <a:fld id="{F3B4B977-AD5C-4F3D-992F-860711DBDA8C}" type="datetimeFigureOut">
               <a:rPr lang="pt-BR" smtClean="0"/>
-              <a:t>16/10/2025</a:t>
+              <a:t>17/10/2025</a:t>
             </a:fld>
             <a:endParaRPr lang="pt-BR" dirty="0"/>
           </a:p>
@@ -1423,7 +1423,7 @@
           <a:p>
             <a:fld id="{F3B4B977-AD5C-4F3D-992F-860711DBDA8C}" type="datetimeFigureOut">
               <a:rPr lang="pt-BR" smtClean="0"/>
-              <a:t>16/10/2025</a:t>
+              <a:t>17/10/2025</a:t>
             </a:fld>
             <a:endParaRPr lang="pt-BR" dirty="0"/>
           </a:p>
@@ -1708,7 +1708,7 @@
           <a:p>
             <a:fld id="{F3B4B977-AD5C-4F3D-992F-860711DBDA8C}" type="datetimeFigureOut">
               <a:rPr lang="pt-BR" smtClean="0"/>
-              <a:t>16/10/2025</a:t>
+              <a:t>17/10/2025</a:t>
             </a:fld>
             <a:endParaRPr lang="pt-BR" dirty="0"/>
           </a:p>
@@ -2127,7 +2127,7 @@
           <a:p>
             <a:fld id="{F3B4B977-AD5C-4F3D-992F-860711DBDA8C}" type="datetimeFigureOut">
               <a:rPr lang="pt-BR" smtClean="0"/>
-              <a:t>16/10/2025</a:t>
+              <a:t>17/10/2025</a:t>
             </a:fld>
             <a:endParaRPr lang="pt-BR" dirty="0"/>
           </a:p>
@@ -2244,7 +2244,7 @@
           <a:p>
             <a:fld id="{F3B4B977-AD5C-4F3D-992F-860711DBDA8C}" type="datetimeFigureOut">
               <a:rPr lang="pt-BR" smtClean="0"/>
-              <a:t>16/10/2025</a:t>
+              <a:t>17/10/2025</a:t>
             </a:fld>
             <a:endParaRPr lang="pt-BR" dirty="0"/>
           </a:p>
@@ -2339,7 +2339,7 @@
           <a:p>
             <a:fld id="{F3B4B977-AD5C-4F3D-992F-860711DBDA8C}" type="datetimeFigureOut">
               <a:rPr lang="pt-BR" smtClean="0"/>
-              <a:t>16/10/2025</a:t>
+              <a:t>17/10/2025</a:t>
             </a:fld>
             <a:endParaRPr lang="pt-BR" dirty="0"/>
           </a:p>
@@ -2614,7 +2614,7 @@
           <a:p>
             <a:fld id="{F3B4B977-AD5C-4F3D-992F-860711DBDA8C}" type="datetimeFigureOut">
               <a:rPr lang="pt-BR" smtClean="0"/>
-              <a:t>16/10/2025</a:t>
+              <a:t>17/10/2025</a:t>
             </a:fld>
             <a:endParaRPr lang="pt-BR" dirty="0"/>
           </a:p>
@@ -2866,7 +2866,7 @@
           <a:p>
             <a:fld id="{F3B4B977-AD5C-4F3D-992F-860711DBDA8C}" type="datetimeFigureOut">
               <a:rPr lang="pt-BR" smtClean="0"/>
-              <a:t>16/10/2025</a:t>
+              <a:t>17/10/2025</a:t>
             </a:fld>
             <a:endParaRPr lang="pt-BR" dirty="0"/>
           </a:p>
@@ -3082,7 +3082,7 @@
           <a:p>
             <a:fld id="{F3B4B977-AD5C-4F3D-992F-860711DBDA8C}" type="datetimeFigureOut">
               <a:rPr lang="pt-BR" smtClean="0"/>
-              <a:t>16/10/2025</a:t>
+              <a:t>17/10/2025</a:t>
             </a:fld>
             <a:endParaRPr lang="pt-BR" dirty="0"/>
           </a:p>
@@ -4540,42 +4540,6 @@
           </a:prstGeom>
         </p:spPr>
       </p:pic>
-      <p:pic>
-        <p:nvPicPr>
-          <p:cNvPr id="3" name="Gráfico 2">
-            <a:extLst>
-              <a:ext uri="{FF2B5EF4-FFF2-40B4-BE49-F238E27FC236}">
-                <a16:creationId xmlns:a16="http://schemas.microsoft.com/office/drawing/2014/main" id="{8CFE6D3D-BC1C-B1B4-9B68-2952D3D7ECC9}"/>
-              </a:ext>
-            </a:extLst>
-          </p:cNvPr>
-          <p:cNvPicPr>
-            <a:picLocks noChangeAspect="1"/>
-          </p:cNvPicPr>
-          <p:nvPr/>
-        </p:nvPicPr>
-        <p:blipFill>
-          <a:blip r:embed="rId3">
-            <a:extLst>
-              <a:ext uri="{96DAC541-7B7A-43D3-8B79-37D633B846F1}">
-                <asvg:svgBlip xmlns:asvg="http://schemas.microsoft.com/office/drawing/2016/SVG/main" r:embed="rId4"/>
-              </a:ext>
-            </a:extLst>
-          </a:blip>
-          <a:stretch>
-            <a:fillRect/>
-          </a:stretch>
-        </p:blipFill>
-        <p:spPr>
-          <a:xfrm>
-            <a:off x="0" y="980728"/>
-            <a:ext cx="9144000" cy="5633663"/>
-          </a:xfrm>
-          <a:prstGeom prst="rect">
-            <a:avLst/>
-          </a:prstGeom>
-        </p:spPr>
-      </p:pic>
     </p:spTree>
     <p:extLst>
       <p:ext uri="{BB962C8B-B14F-4D97-AF65-F5344CB8AC3E}">
@@ -5593,7 +5557,7 @@
         <p:spPr>
           <a:xfrm>
             <a:off x="971600" y="1700808"/>
-            <a:ext cx="5904656" cy="1754326"/>
+            <a:ext cx="5904656" cy="1477328"/>
           </a:xfrm>
           <a:prstGeom prst="rect">
             <a:avLst/>
@@ -5616,7 +5580,7 @@
             </a:r>
             <a:r>
               <a:rPr lang="pt-BR" dirty="0"/>
-              <a:t> Ao sair do cruzamento, ele libera as posições uma a uma, ou o caminho todo, dependendo da implementação.</a:t>
+              <a:t> Ao sair do cruzamento, ele libera as posições uma a uma, conforme avança em seu movimento.</a:t>
             </a:r>
           </a:p>
           <a:p>

</xml_diff>